<commit_message>
added pptx, input, and output, and mp4
</commit_message>
<xml_diff>
--- a/FinalExam.pptx
+++ b/FinalExam.pptx
@@ -112,6 +112,11 @@
       </a:defRPr>
     </a:lvl9pPr>
   </p:defaultTextStyle>
+  <p:extLst>
+    <p:ext uri="{EFAFB233-063F-42B5-8137-9DF3F51BA10A}">
+      <p15:sldGuideLst xmlns:p15="http://schemas.microsoft.com/office/powerpoint/2012/main"/>
+    </p:ext>
+  </p:extLst>
 </p:presentation>
 </file>
 
@@ -11449,11 +11454,11 @@
       </p:sp>
       <p:pic>
         <p:nvPicPr>
-          <p:cNvPr id="4" name="Parser">
+          <p:cNvPr id="6" name="llparser">
             <a:hlinkClick r:id="" action="ppaction://media"/>
             <a:extLst>
               <a:ext uri="{FF2B5EF4-FFF2-40B4-BE49-F238E27FC236}">
-                <a16:creationId xmlns:a16="http://schemas.microsoft.com/office/drawing/2014/main" id="{05720C1E-0943-4725-9760-E6C30A7B007C}"/>
+                <a16:creationId xmlns:a16="http://schemas.microsoft.com/office/drawing/2014/main" id="{0B520A29-A206-4D1B-8B9B-854E03C0CC24}"/>
               </a:ext>
             </a:extLst>
           </p:cNvPr>
@@ -11478,8 +11483,8 @@
         </p:blipFill>
         <p:spPr>
           <a:xfrm>
-            <a:off x="3558554" y="2044148"/>
-            <a:ext cx="6716712" cy="3778250"/>
+            <a:off x="2893150" y="1640285"/>
+            <a:ext cx="8311235" cy="4675193"/>
           </a:xfrm>
         </p:spPr>
       </p:pic>
@@ -11521,9 +11526,9 @@
                                   <p:childTnLst>
                                     <p:cmd type="call" cmd="playFrom(0.0)">
                                       <p:cBhvr>
-                                        <p:cTn id="6" dur="58091" fill="hold"/>
+                                        <p:cTn id="6" dur="49963" fill="hold"/>
                                         <p:tgtEl>
-                                          <p:spTgt spid="4"/>
+                                          <p:spTgt spid="6"/>
                                         </p:tgtEl>
                                       </p:cBhvr>
                                     </p:cmd>
@@ -11561,7 +11566,7 @@
                   </p:stCondLst>
                 </p:cTn>
                 <p:tgtEl>
-                  <p:spTgt spid="4"/>
+                  <p:spTgt spid="6"/>
                 </p:tgtEl>
               </p:cMediaNode>
             </p:video>
@@ -11570,7 +11575,7 @@
                 <p:stCondLst>
                   <p:cond evt="onClick" delay="0">
                     <p:tgtEl>
-                      <p:spTgt spid="4"/>
+                      <p:spTgt spid="6"/>
                     </p:tgtEl>
                   </p:cond>
                 </p:stCondLst>
@@ -11600,7 +11605,7 @@
                                       <p:cBhvr>
                                         <p:cTn id="12" dur="1" fill="hold"/>
                                         <p:tgtEl>
-                                          <p:spTgt spid="4"/>
+                                          <p:spTgt spid="6"/>
                                         </p:tgtEl>
                                       </p:cBhvr>
                                     </p:cmd>
@@ -11618,7 +11623,7 @@
               <p:nextCondLst>
                 <p:cond evt="onClick" delay="0">
                   <p:tgtEl>
-                    <p:spTgt spid="4"/>
+                    <p:spTgt spid="6"/>
                   </p:tgtEl>
                 </p:cond>
               </p:nextCondLst>
@@ -11850,41 +11855,33 @@
           <a:p>
             <a:r>
               <a:rPr lang="en-US" dirty="0"/>
-              <a:t>expr: TERMINAL symbol union expr| LPAREN expr RPAREN symbol union expr|  ;</a:t>
+              <a:t>expr: id union expr| LPAREN expr RPAREN symbol union expr| ‘’ ;</a:t>
             </a:r>
           </a:p>
           <a:p>
             <a:r>
               <a:rPr lang="en-US" dirty="0"/>
-              <a:t>symbol: '*’ | '+’ | '?’ |  ;</a:t>
+              <a:t>symbol: '*’ | '+’ | '?’ | ‘’ ;</a:t>
             </a:r>
           </a:p>
           <a:p>
             <a:r>
               <a:rPr lang="en-US" dirty="0"/>
-              <a:t>union: 'U' </a:t>
-            </a:r>
-            <a:r>
-              <a:rPr lang="en-US" dirty="0" err="1"/>
-              <a:t>extd</a:t>
-            </a:r>
+              <a:t>union: 'U' |’’ ;</a:t>
+            </a:r>
+          </a:p>
+          <a:p>
             <a:r>
               <a:rPr lang="en-US" dirty="0"/>
-              <a:t>| ;</a:t>
-            </a:r>
-          </a:p>
-          <a:p>
-            <a:r>
-              <a:rPr lang="en-US" dirty="0" err="1"/>
-              <a:t>extd</a:t>
-            </a:r>
+              <a:t>id: TERMINAL symbol | 'E’ ;</a:t>
+            </a:r>
+          </a:p>
+          <a:p>
+            <a:pPr lvl="1"/>
             <a:r>
               <a:rPr lang="en-US" dirty="0"/>
-              <a:t>: 'E’|  ;</a:t>
-            </a:r>
-          </a:p>
-          <a:p>
-            <a:endParaRPr lang="en-US" dirty="0"/>
+              <a:t>‘’ is epsilon</a:t>
+            </a:r>
           </a:p>
           <a:p>
             <a:r>
@@ -12046,6 +12043,17 @@
             <a:r>
               <a:rPr lang="en-US" dirty="0"/>
               <a:t>Given K1, and the current token is K2, execute this rule</a:t>
+            </a:r>
+          </a:p>
+          <a:p>
+            <a:pPr lvl="2"/>
+            <a:r>
+              <a:rPr lang="en-US" dirty="0"/>
+              <a:t>If found return rule, else return null (which </a:t>
+            </a:r>
+            <a:r>
+              <a:rPr lang="en-US"/>
+              <a:t>exits the parsing)</a:t>
             </a:r>
             <a:endParaRPr lang="en-PH" dirty="0"/>
           </a:p>

</xml_diff>